<commit_message>
actualización contenido del curso
</commit_message>
<xml_diff>
--- a/basico/ppt/2. Resumen HTMLyCSS Basico .pptx
+++ b/basico/ppt/2. Resumen HTMLyCSS Basico .pptx
@@ -5,7 +5,7 @@
     <p:sldMasterId id="2147483659" r:id="rId1"/>
   </p:sldMasterIdLst>
   <p:notesMasterIdLst>
-    <p:notesMasterId r:id="rId19"/>
+    <p:notesMasterId r:id="rId18"/>
   </p:notesMasterIdLst>
   <p:sldIdLst>
     <p:sldId id="256" r:id="rId2"/>
@@ -24,35 +24,34 @@
     <p:sldId id="269" r:id="rId15"/>
     <p:sldId id="270" r:id="rId16"/>
     <p:sldId id="271" r:id="rId17"/>
-    <p:sldId id="272" r:id="rId18"/>
   </p:sldIdLst>
   <p:sldSz cx="9144000" cy="5143500" type="screen16x9"/>
   <p:notesSz cx="6858000" cy="9144000"/>
   <p:embeddedFontLst>
     <p:embeddedFont>
       <p:font typeface="Calibri" panose="020F0502020204030204" pitchFamily="34" charset="0"/>
-      <p:regular r:id="rId20"/>
-      <p:bold r:id="rId21"/>
-      <p:italic r:id="rId22"/>
-      <p:boldItalic r:id="rId23"/>
+      <p:regular r:id="rId19"/>
+      <p:bold r:id="rId20"/>
+      <p:italic r:id="rId21"/>
+      <p:boldItalic r:id="rId22"/>
     </p:embeddedFont>
     <p:embeddedFont>
       <p:font typeface="Consolas" panose="020B0609020204030204" pitchFamily="49" charset="0"/>
-      <p:regular r:id="rId24"/>
-      <p:bold r:id="rId25"/>
-      <p:italic r:id="rId26"/>
-      <p:boldItalic r:id="rId27"/>
+      <p:regular r:id="rId23"/>
+      <p:bold r:id="rId24"/>
+      <p:italic r:id="rId25"/>
+      <p:boldItalic r:id="rId26"/>
     </p:embeddedFont>
     <p:embeddedFont>
       <p:font typeface="Lobster" panose="020B0604020202020204" charset="0"/>
-      <p:regular r:id="rId28"/>
+      <p:regular r:id="rId27"/>
     </p:embeddedFont>
     <p:embeddedFont>
       <p:font typeface="Nunito" pitchFamily="2" charset="0"/>
-      <p:regular r:id="rId29"/>
-      <p:bold r:id="rId30"/>
-      <p:italic r:id="rId31"/>
-      <p:boldItalic r:id="rId32"/>
+      <p:regular r:id="rId28"/>
+      <p:bold r:id="rId29"/>
+      <p:italic r:id="rId30"/>
+      <p:boldItalic r:id="rId31"/>
     </p:embeddedFont>
   </p:embeddedFontLst>
   <p:defaultTextStyle>
@@ -1533,110 +1532,6 @@
       <p:sp>
         <p:nvSpPr>
           <p:cNvPr id="233" name="Google Shape;233;g2d605d81ece_0_184:notes"/>
-          <p:cNvSpPr txBox="1">
-            <a:spLocks noGrp="1"/>
-          </p:cNvSpPr>
-          <p:nvPr>
-            <p:ph type="body" idx="1"/>
-          </p:nvPr>
-        </p:nvSpPr>
-        <p:spPr>
-          <a:xfrm>
-            <a:off x="685800" y="4343400"/>
-            <a:ext cx="5486400" cy="4114800"/>
-          </a:xfrm>
-          <a:prstGeom prst="rect">
-            <a:avLst/>
-          </a:prstGeom>
-        </p:spPr>
-        <p:txBody>
-          <a:bodyPr spcFirstLastPara="1" wrap="square" lIns="91425" tIns="91425" rIns="91425" bIns="91425" anchor="t" anchorCtr="0">
-            <a:noAutofit/>
-          </a:bodyPr>
-          <a:lstStyle/>
-          <a:p>
-            <a:pPr marL="0" lvl="0" indent="0" algn="l" rtl="0">
-              <a:spcBef>
-                <a:spcPts val="0"/>
-              </a:spcBef>
-              <a:spcAft>
-                <a:spcPts val="0"/>
-              </a:spcAft>
-              <a:buNone/>
-            </a:pPr>
-            <a:endParaRPr/>
-          </a:p>
-        </p:txBody>
-      </p:sp>
-    </p:spTree>
-  </p:cSld>
-  <p:clrMapOvr>
-    <a:masterClrMapping/>
-  </p:clrMapOvr>
-</p:notes>
-</file>
-
-<file path=ppt/notesSlides/notesSlide17.xml><?xml version="1.0" encoding="utf-8"?>
-<p:notes xmlns:a="http://schemas.openxmlformats.org/drawingml/2006/main" xmlns:r="http://schemas.openxmlformats.org/officeDocument/2006/relationships" xmlns:p="http://schemas.openxmlformats.org/presentationml/2006/main" showMasterSp="0" showMasterPhAnim="0">
-  <p:cSld>
-    <p:spTree>
-      <p:nvGrpSpPr>
-        <p:cNvPr id="1" name="Shape 237"/>
-        <p:cNvGrpSpPr/>
-        <p:nvPr/>
-      </p:nvGrpSpPr>
-      <p:grpSpPr>
-        <a:xfrm>
-          <a:off x="0" y="0"/>
-          <a:ext cx="0" cy="0"/>
-          <a:chOff x="0" y="0"/>
-          <a:chExt cx="0" cy="0"/>
-        </a:xfrm>
-      </p:grpSpPr>
-      <p:sp>
-        <p:nvSpPr>
-          <p:cNvPr id="238" name="Google Shape;238;g2d605d81ece_0_39:notes"/>
-          <p:cNvSpPr>
-            <a:spLocks noGrp="1" noRot="1" noChangeAspect="1"/>
-          </p:cNvSpPr>
-          <p:nvPr>
-            <p:ph type="sldImg" idx="2"/>
-          </p:nvPr>
-        </p:nvSpPr>
-        <p:spPr>
-          <a:xfrm>
-            <a:off x="381300" y="685800"/>
-            <a:ext cx="6096000" cy="3429000"/>
-          </a:xfrm>
-          <a:custGeom>
-            <a:avLst/>
-            <a:gdLst/>
-            <a:ahLst/>
-            <a:cxnLst/>
-            <a:rect l="l" t="t" r="r" b="b"/>
-            <a:pathLst>
-              <a:path w="120000" h="120000" extrusionOk="0">
-                <a:moveTo>
-                  <a:pt x="0" y="0"/>
-                </a:moveTo>
-                <a:lnTo>
-                  <a:pt x="120000" y="0"/>
-                </a:lnTo>
-                <a:lnTo>
-                  <a:pt x="120000" y="120000"/>
-                </a:lnTo>
-                <a:lnTo>
-                  <a:pt x="0" y="120000"/>
-                </a:lnTo>
-                <a:close/>
-              </a:path>
-            </a:pathLst>
-          </a:custGeom>
-        </p:spPr>
-      </p:sp>
-      <p:sp>
-        <p:nvSpPr>
-          <p:cNvPr id="239" name="Google Shape;239;g2d605d81ece_0_39:notes"/>
           <p:cNvSpPr txBox="1">
             <a:spLocks noGrp="1"/>
           </p:cNvSpPr>
@@ -12336,138 +12231,6 @@
 </p:sld>
 </file>
 
-<file path=ppt/slides/slide17.xml><?xml version="1.0" encoding="utf-8"?>
-<p:sld xmlns:a="http://schemas.openxmlformats.org/drawingml/2006/main" xmlns:r="http://schemas.openxmlformats.org/officeDocument/2006/relationships" xmlns:p="http://schemas.openxmlformats.org/presentationml/2006/main">
-  <p:cSld>
-    <p:spTree>
-      <p:nvGrpSpPr>
-        <p:cNvPr id="1" name="Shape 240"/>
-        <p:cNvGrpSpPr/>
-        <p:nvPr/>
-      </p:nvGrpSpPr>
-      <p:grpSpPr>
-        <a:xfrm>
-          <a:off x="0" y="0"/>
-          <a:ext cx="0" cy="0"/>
-          <a:chOff x="0" y="0"/>
-          <a:chExt cx="0" cy="0"/>
-        </a:xfrm>
-      </p:grpSpPr>
-      <p:sp>
-        <p:nvSpPr>
-          <p:cNvPr id="241" name="Google Shape;241;p29"/>
-          <p:cNvSpPr txBox="1"/>
-          <p:nvPr/>
-        </p:nvSpPr>
-        <p:spPr>
-          <a:xfrm>
-            <a:off x="209700" y="201850"/>
-            <a:ext cx="8724600" cy="942000"/>
-          </a:xfrm>
-          <a:prstGeom prst="rect">
-            <a:avLst/>
-          </a:prstGeom>
-          <a:noFill/>
-          <a:ln>
-            <a:noFill/>
-          </a:ln>
-        </p:spPr>
-        <p:txBody>
-          <a:bodyPr spcFirstLastPara="1" wrap="square" lIns="91425" tIns="91425" rIns="91425" bIns="91425" anchor="t" anchorCtr="0">
-            <a:noAutofit/>
-          </a:bodyPr>
-          <a:lstStyle/>
-          <a:p>
-            <a:pPr marL="0" lvl="0" indent="0" algn="l" rtl="0">
-              <a:lnSpc>
-                <a:spcPct val="125000"/>
-              </a:lnSpc>
-              <a:spcBef>
-                <a:spcPts val="1400"/>
-              </a:spcBef>
-              <a:spcAft>
-                <a:spcPts val="0"/>
-              </a:spcAft>
-              <a:buNone/>
-            </a:pPr>
-            <a:r>
-              <a:rPr lang="es" sz="3500" b="1">
-                <a:solidFill>
-                  <a:schemeClr val="lt1"/>
-                </a:solidFill>
-                <a:latin typeface="Nunito"/>
-                <a:ea typeface="Nunito"/>
-                <a:cs typeface="Nunito"/>
-                <a:sym typeface="Nunito"/>
-              </a:rPr>
-              <a:t>Introducción a CSS3 y Selectores Básicos</a:t>
-            </a:r>
-            <a:endParaRPr sz="3500" b="1">
-              <a:solidFill>
-                <a:schemeClr val="lt1"/>
-              </a:solidFill>
-              <a:latin typeface="Nunito"/>
-              <a:ea typeface="Nunito"/>
-              <a:cs typeface="Nunito"/>
-              <a:sym typeface="Nunito"/>
-            </a:endParaRPr>
-          </a:p>
-          <a:p>
-            <a:pPr marL="0" lvl="0" indent="0" algn="l" rtl="0">
-              <a:lnSpc>
-                <a:spcPct val="125000"/>
-              </a:lnSpc>
-              <a:spcBef>
-                <a:spcPts val="1400"/>
-              </a:spcBef>
-              <a:spcAft>
-                <a:spcPts val="0"/>
-              </a:spcAft>
-              <a:buNone/>
-            </a:pPr>
-            <a:endParaRPr sz="3500" b="1">
-              <a:solidFill>
-                <a:schemeClr val="lt1"/>
-              </a:solidFill>
-              <a:latin typeface="Nunito"/>
-              <a:ea typeface="Nunito"/>
-              <a:cs typeface="Nunito"/>
-              <a:sym typeface="Nunito"/>
-            </a:endParaRPr>
-          </a:p>
-          <a:p>
-            <a:pPr marL="0" lvl="0" indent="0" algn="l" rtl="0">
-              <a:lnSpc>
-                <a:spcPct val="125000"/>
-              </a:lnSpc>
-              <a:spcBef>
-                <a:spcPts val="1400"/>
-              </a:spcBef>
-              <a:spcAft>
-                <a:spcPts val="400"/>
-              </a:spcAft>
-              <a:buNone/>
-            </a:pPr>
-            <a:endParaRPr sz="3500" b="1">
-              <a:solidFill>
-                <a:schemeClr val="lt1"/>
-              </a:solidFill>
-              <a:latin typeface="Nunito"/>
-              <a:ea typeface="Nunito"/>
-              <a:cs typeface="Nunito"/>
-              <a:sym typeface="Nunito"/>
-            </a:endParaRPr>
-          </a:p>
-        </p:txBody>
-      </p:sp>
-    </p:spTree>
-  </p:cSld>
-  <p:clrMapOvr>
-    <a:masterClrMapping/>
-  </p:clrMapOvr>
-</p:sld>
-</file>
-
 <file path=ppt/slides/slide2.xml><?xml version="1.0" encoding="utf-8"?>
 <p:sld xmlns:a="http://schemas.openxmlformats.org/drawingml/2006/main" xmlns:r="http://schemas.openxmlformats.org/officeDocument/2006/relationships" xmlns:p="http://schemas.openxmlformats.org/presentationml/2006/main">
   <p:cSld>

</xml_diff>